<commit_message>
Moved from default template to my own template.
</commit_message>
<xml_diff>
--- a/PluralsightPublisher/Deliverables/PluralsightSlideTemplate.pptx
+++ b/PluralsightPublisher/Deliverables/PluralsightSlideTemplate.pptx
@@ -6,8 +6,6 @@
   </p:sldMasterIdLst>
   <p:sldIdLst>
     <p:sldId id="256" r:id="rId2"/>
-    <p:sldId id="257" r:id="rId3"/>
-    <p:sldId id="258" r:id="rId4"/>
   </p:sldIdLst>
   <p:sldSz cx="9144000" cy="6858000" type="screen4x3"/>
   <p:notesSz cx="6858000" cy="9144000"/>
@@ -112,8 +110,6 @@
         <p14:section name="Default Section" id="{1BC19922-299D-473A-9E2A-48F5A73993DD}">
           <p14:sldIdLst>
             <p14:sldId id="256"/>
-            <p14:sldId id="257"/>
-            <p14:sldId id="258"/>
           </p14:sldIdLst>
         </p14:section>
         <p14:section name="Untitled Section" id="{ADA4AF12-1FC1-4E13-9510-FCC2A6F229C0}">
@@ -122,7 +118,7 @@
       </p14:sectionLst>
     </p:ext>
     <p:ext uri="{EFAFB233-063F-42B5-8137-9DF3F51BA10A}">
-      <p15:sldGuideLst xmlns:p15="http://schemas.microsoft.com/office/powerpoint/2012/main" xmlns="">
+      <p15:sldGuideLst xmlns="" xmlns:p15="http://schemas.microsoft.com/office/powerpoint/2012/main">
         <p15:guide id="1" orient="horz" pos="2160">
           <p15:clr>
             <a:srgbClr val="A4A3A4"/>
@@ -1811,7 +1807,7 @@
           <a:p>
             <a:r>
               <a:rPr lang="en-US" dirty="0" smtClean="0"/>
-              <a:t>&lt;Course or Module Title&gt;</a:t>
+              <a:t>Course Name</a:t>
             </a:r>
             <a:endParaRPr lang="en-US" dirty="0"/>
           </a:p>
@@ -1839,8 +1835,9 @@
           <a:p>
             <a:r>
               <a:rPr lang="en-US" dirty="0" smtClean="0"/>
-              <a:t>&lt;Course or Module Subtitle&gt;</a:t>
-            </a:r>
+              <a:t>Module Name</a:t>
+            </a:r>
+            <a:endParaRPr lang="en-US" dirty="0" smtClean="0"/>
           </a:p>
           <a:p>
             <a:endParaRPr lang="en-US" dirty="0" smtClean="0"/>
@@ -1924,7 +1921,7 @@
               <a:rPr lang="en-US" dirty="0" smtClean="0">
                 <a:latin typeface="+mj-lt"/>
               </a:rPr>
-              <a:t>&lt;Author Name&gt;</a:t>
+              <a:t>Erik Dietrich</a:t>
             </a:r>
             <a:endParaRPr lang="en-US" dirty="0">
               <a:latin typeface="+mj-lt"/>
@@ -1936,7 +1933,7 @@
               <a:rPr lang="en-US" dirty="0" smtClean="0">
                 <a:latin typeface="+mj-lt"/>
               </a:rPr>
-              <a:t>&lt;Author URL&gt;</a:t>
+              <a:t>http://www.daedtech.com</a:t>
             </a:r>
             <a:endParaRPr lang="en-US" dirty="0">
               <a:latin typeface="+mj-lt"/>
@@ -1948,7 +1945,7 @@
               <a:rPr lang="en-US" dirty="0" smtClean="0">
                 <a:latin typeface="+mj-lt"/>
               </a:rPr>
-              <a:t>&lt;Author Email&gt;</a:t>
+              <a:t>erik@daedtech.com</a:t>
             </a:r>
             <a:endParaRPr lang="en-US" dirty="0">
               <a:latin typeface="+mj-lt"/>
@@ -1956,6 +1953,24 @@
           </a:p>
           <a:p>
             <a:pPr algn="r"/>
+            <a:r>
+              <a:rPr lang="en-US" sz="1800" dirty="0" smtClean="0">
+                <a:solidFill>
+                  <a:srgbClr val="002060"/>
+                </a:solidFill>
+                <a:latin typeface="+mj-lt"/>
+              </a:rPr>
+              <a:t>@</a:t>
+            </a:r>
+            <a:r>
+              <a:rPr lang="en-US" sz="1800" dirty="0" err="1" smtClean="0">
+                <a:solidFill>
+                  <a:srgbClr val="002060"/>
+                </a:solidFill>
+                <a:latin typeface="+mj-lt"/>
+              </a:rPr>
+              <a:t>daedtech</a:t>
+            </a:r>
             <a:endParaRPr lang="en-US" sz="1800" dirty="0">
               <a:solidFill>
                 <a:srgbClr val="002060"/>
@@ -1967,32 +1982,43 @@
       </p:sp>
       <p:pic>
         <p:nvPicPr>
-          <p:cNvPr id="9" name="Picture 8"/>
+          <p:cNvPr id="1026" name="Picture 2" descr="http://m.c.lnkd.licdn.com/mpr/mpr/shrink_200_200/p/4/000/15c/323/3deb8c4.jpg"/>
           <p:cNvPicPr>
-            <a:picLocks noChangeAspect="1"/>
+            <a:picLocks noChangeAspect="1" noChangeArrowheads="1"/>
           </p:cNvPicPr>
           <p:nvPr/>
         </p:nvPicPr>
         <p:blipFill>
-          <a:blip r:embed="rId2" cstate="print">
+          <a:blip r:embed="rId2">
             <a:extLst>
               <a:ext uri="{28A0092B-C50C-407E-A947-70E740481C1C}">
                 <a14:useLocalDpi xmlns:a14="http://schemas.microsoft.com/office/drawing/2010/main" val="0"/>
               </a:ext>
             </a:extLst>
           </a:blip>
+          <a:srcRect/>
           <a:stretch>
             <a:fillRect/>
           </a:stretch>
         </p:blipFill>
-        <p:spPr>
+        <p:spPr bwMode="auto">
           <a:xfrm>
-            <a:off x="7402033" y="3483934"/>
-            <a:ext cx="867191" cy="877824"/>
+            <a:off x="7400544" y="3489741"/>
+            <a:ext cx="868680" cy="868680"/>
           </a:xfrm>
           <a:prstGeom prst="rect">
             <a:avLst/>
           </a:prstGeom>
+          <a:noFill/>
+          <a:extLst>
+            <a:ext uri="{909E8E84-426E-40DD-AFC4-6F175D3DCCD1}">
+              <a14:hiddenFill xmlns:a14="http://schemas.microsoft.com/office/drawing/2010/main">
+                <a:solidFill>
+                  <a:srgbClr val="FFFFFF"/>
+                </a:solidFill>
+              </a14:hiddenFill>
+            </a:ext>
+          </a:extLst>
         </p:spPr>
       </p:pic>
     </p:spTree>
@@ -2015,185 +2041,6 @@
       </p:par>
     </p:tnLst>
   </p:timing>
-</p:sld>
-</file>
-
-<file path=ppt/slides/slide2.xml><?xml version="1.0" encoding="utf-8"?>
-<p:sld xmlns:a="http://schemas.openxmlformats.org/drawingml/2006/main" xmlns:r="http://schemas.openxmlformats.org/officeDocument/2006/relationships" xmlns:p="http://schemas.openxmlformats.org/presentationml/2006/main">
-  <p:cSld>
-    <p:spTree>
-      <p:nvGrpSpPr>
-        <p:cNvPr id="1" name=""/>
-        <p:cNvGrpSpPr/>
-        <p:nvPr/>
-      </p:nvGrpSpPr>
-      <p:grpSpPr>
-        <a:xfrm>
-          <a:off x="0" y="0"/>
-          <a:ext cx="0" cy="0"/>
-          <a:chOff x="0" y="0"/>
-          <a:chExt cx="0" cy="0"/>
-        </a:xfrm>
-      </p:grpSpPr>
-      <p:sp>
-        <p:nvSpPr>
-          <p:cNvPr id="2" name="Title 1"/>
-          <p:cNvSpPr>
-            <a:spLocks noGrp="1"/>
-          </p:cNvSpPr>
-          <p:nvPr>
-            <p:ph type="title"/>
-          </p:nvPr>
-        </p:nvSpPr>
-        <p:spPr/>
-        <p:txBody>
-          <a:bodyPr/>
-          <a:lstStyle/>
-          <a:p>
-            <a:r>
-              <a:rPr lang="en-US" dirty="0"/>
-              <a:t>Slide Title (Myriad Pro 28, bold)</a:t>
-            </a:r>
-          </a:p>
-        </p:txBody>
-      </p:sp>
-      <p:sp>
-        <p:nvSpPr>
-          <p:cNvPr id="3" name="Text Placeholder 2"/>
-          <p:cNvSpPr>
-            <a:spLocks noGrp="1"/>
-          </p:cNvSpPr>
-          <p:nvPr>
-            <p:ph type="body" idx="1"/>
-          </p:nvPr>
-        </p:nvSpPr>
-        <p:spPr/>
-        <p:txBody>
-          <a:bodyPr/>
-          <a:lstStyle/>
-          <a:p>
-            <a:r>
-              <a:rPr lang="en-US" dirty="0"/>
-              <a:t>Top level bullet (Myriad Pro Light 20, bold)</a:t>
-            </a:r>
-          </a:p>
-          <a:p>
-            <a:pPr lvl="1"/>
-            <a:r>
-              <a:rPr lang="en-US" dirty="0"/>
-              <a:t>Second level bullet (Myriad Pro 18)</a:t>
-            </a:r>
-          </a:p>
-          <a:p>
-            <a:pPr lvl="1"/>
-            <a:endParaRPr lang="en-US" dirty="0"/>
-          </a:p>
-        </p:txBody>
-      </p:sp>
-    </p:spTree>
-    <p:extLst>
-      <p:ext uri="{BB962C8B-B14F-4D97-AF65-F5344CB8AC3E}">
-        <p14:creationId xmlns:p14="http://schemas.microsoft.com/office/powerpoint/2010/main" val="2460144442"/>
-      </p:ext>
-    </p:extLst>
-  </p:cSld>
-  <p:clrMapOvr>
-    <a:masterClrMapping/>
-  </p:clrMapOvr>
-  <p:transition>
-    <p:fade/>
-  </p:transition>
-</p:sld>
-</file>
-
-<file path=ppt/slides/slide3.xml><?xml version="1.0" encoding="utf-8"?>
-<p:sld xmlns:a="http://schemas.openxmlformats.org/drawingml/2006/main" xmlns:r="http://schemas.openxmlformats.org/officeDocument/2006/relationships" xmlns:p="http://schemas.openxmlformats.org/presentationml/2006/main">
-  <p:cSld>
-    <p:spTree>
-      <p:nvGrpSpPr>
-        <p:cNvPr id="1" name=""/>
-        <p:cNvGrpSpPr/>
-        <p:nvPr/>
-      </p:nvGrpSpPr>
-      <p:grpSpPr>
-        <a:xfrm>
-          <a:off x="0" y="0"/>
-          <a:ext cx="0" cy="0"/>
-          <a:chOff x="0" y="0"/>
-          <a:chExt cx="0" cy="0"/>
-        </a:xfrm>
-      </p:grpSpPr>
-      <p:sp>
-        <p:nvSpPr>
-          <p:cNvPr id="2" name="Title 1"/>
-          <p:cNvSpPr>
-            <a:spLocks noGrp="1"/>
-          </p:cNvSpPr>
-          <p:nvPr>
-            <p:ph type="title"/>
-          </p:nvPr>
-        </p:nvSpPr>
-        <p:spPr/>
-        <p:txBody>
-          <a:bodyPr/>
-          <a:lstStyle/>
-          <a:p>
-            <a:r>
-              <a:rPr lang="en-US" dirty="0" smtClean="0"/>
-              <a:t>Summary</a:t>
-            </a:r>
-            <a:endParaRPr lang="en-US" dirty="0"/>
-          </a:p>
-        </p:txBody>
-      </p:sp>
-      <p:sp>
-        <p:nvSpPr>
-          <p:cNvPr id="3" name="Text Placeholder 2"/>
-          <p:cNvSpPr>
-            <a:spLocks noGrp="1"/>
-          </p:cNvSpPr>
-          <p:nvPr>
-            <p:ph type="body" idx="1"/>
-          </p:nvPr>
-        </p:nvSpPr>
-        <p:spPr/>
-        <p:txBody>
-          <a:bodyPr/>
-          <a:lstStyle/>
-          <a:p>
-            <a:r>
-              <a:rPr lang="en-US" dirty="0"/>
-              <a:t>High level </a:t>
-            </a:r>
-            <a:r>
-              <a:rPr lang="en-US" dirty="0" smtClean="0"/>
-              <a:t>concept 1</a:t>
-            </a:r>
-          </a:p>
-          <a:p>
-            <a:r>
-              <a:rPr lang="en-US"/>
-              <a:t>High level concept 1</a:t>
-            </a:r>
-          </a:p>
-          <a:p>
-            <a:endParaRPr lang="en-US" dirty="0"/>
-          </a:p>
-        </p:txBody>
-      </p:sp>
-    </p:spTree>
-    <p:extLst>
-      <p:ext uri="{BB962C8B-B14F-4D97-AF65-F5344CB8AC3E}">
-        <p14:creationId xmlns:p14="http://schemas.microsoft.com/office/powerpoint/2010/main" val="2473264541"/>
-      </p:ext>
-    </p:extLst>
-  </p:cSld>
-  <p:clrMapOvr>
-    <a:masterClrMapping/>
-  </p:clrMapOvr>
-  <p:transition>
-    <p:fade/>
-  </p:transition>
 </p:sld>
 </file>
 

</xml_diff>